<commit_message>
refactor: updated PP_templates u_logo
</commit_message>
<xml_diff>
--- a/inst/PP_templates/VI_bla_u_logo_16_9.pptx
+++ b/inst/PP_templates/VI_bla_u_logo_16_9.pptx
@@ -210,7 +210,7 @@
           <a:p>
             <a:fld id="{0F9C1CCF-B725-44A7-AA57-5E433BD85C9F}" type="datetimeFigureOut">
               <a:rPr lang="en-US" smtClean="0"/>
-              <a:t>6/1/2024</a:t>
+              <a:t>6/2/2024</a:t>
             </a:fld>
             <a:endParaRPr lang="en-US"/>
           </a:p>
@@ -685,7 +685,7 @@
 </file>
 
 <file path=ppt/slideLayouts/slideLayout1.xml><?xml version="1.0" encoding="utf-8"?>
-<p:sldLayout xmlns:a="http://schemas.openxmlformats.org/drawingml/2006/main" xmlns:r="http://schemas.openxmlformats.org/officeDocument/2006/relationships" xmlns:p="http://schemas.openxmlformats.org/presentationml/2006/main" showMasterSp="0" preserve="1" userDrawn="1">
+<p:sldLayout xmlns:a="http://schemas.openxmlformats.org/drawingml/2006/main" xmlns:r="http://schemas.openxmlformats.org/officeDocument/2006/relationships" xmlns:p="http://schemas.openxmlformats.org/presentationml/2006/main" preserve="1" userDrawn="1">
   <p:cSld name="Title Slide">
     <p:spTree>
       <p:nvGrpSpPr>
@@ -719,10 +719,9 @@
             <a:srgbClr val="00A6EB"/>
           </a:solidFill>
           <a:ln>
-            <a:solidFill>
-              <a:srgbClr val="00A6EB"/>
-            </a:solidFill>
+            <a:noFill/>
           </a:ln>
+          <a:effectLst/>
         </p:spPr>
         <p:style>
           <a:lnRef idx="1">
@@ -1011,60 +1010,6 @@
                   <a:srgbClr val="FFFFFF">
                     <a:alpha val="31000"/>
                   </a:srgbClr>
-                </a:solidFill>
-              </a14:hiddenFill>
-            </a:ext>
-            <a:ext uri="{91240B29-F687-4F45-9708-019B960494DF}">
-              <a14:hiddenLine xmlns:a14="http://schemas.microsoft.com/office/drawing/2010/main" w="9525">
-                <a:solidFill>
-                  <a:srgbClr val="000000"/>
-                </a:solidFill>
-                <a:miter lim="800000"/>
-                <a:headEnd/>
-                <a:tailEnd/>
-              </a14:hiddenLine>
-            </a:ext>
-          </a:extLst>
-        </p:spPr>
-      </p:pic>
-      <p:pic>
-        <p:nvPicPr>
-          <p:cNvPr id="20" name="Bilde 15" descr="stripe-tynn.jpg"/>
-          <p:cNvPicPr>
-            <a:picLocks/>
-          </p:cNvPicPr>
-          <p:nvPr userDrawn="1"/>
-        </p:nvPicPr>
-        <p:blipFill>
-          <a:blip r:embed="rId4">
-            <a:extLst>
-              <a:ext uri="{28A0092B-C50C-407E-A947-70E740481C1C}">
-                <a14:useLocalDpi xmlns:a14="http://schemas.microsoft.com/office/drawing/2010/main" val="0"/>
-              </a:ext>
-            </a:extLst>
-          </a:blip>
-          <a:srcRect/>
-          <a:stretch>
-            <a:fillRect/>
-          </a:stretch>
-        </p:blipFill>
-        <p:spPr bwMode="auto">
-          <a:xfrm>
-            <a:off x="1" y="5048250"/>
-            <a:ext cx="9144000" cy="95250"/>
-          </a:xfrm>
-          <a:prstGeom prst="rect">
-            <a:avLst/>
-          </a:prstGeom>
-          <a:noFill/>
-          <a:ln>
-            <a:noFill/>
-          </a:ln>
-          <a:extLst>
-            <a:ext uri="{909E8E84-426E-40DD-AFC4-6F175D3DCCD1}">
-              <a14:hiddenFill xmlns:a14="http://schemas.microsoft.com/office/drawing/2010/main">
-                <a:solidFill>
-                  <a:srgbClr val="FFFFFF"/>
                 </a:solidFill>
               </a14:hiddenFill>
             </a:ext>
@@ -1394,7 +1339,7 @@
 </file>
 
 <file path=ppt/slideLayouts/slideLayout12.xml><?xml version="1.0" encoding="utf-8"?>
-<p:sldLayout xmlns:a="http://schemas.openxmlformats.org/drawingml/2006/main" xmlns:r="http://schemas.openxmlformats.org/officeDocument/2006/relationships" xmlns:p="http://schemas.openxmlformats.org/presentationml/2006/main" showMasterSp="0" preserve="1" userDrawn="1">
+<p:sldLayout xmlns:a="http://schemas.openxmlformats.org/drawingml/2006/main" xmlns:r="http://schemas.openxmlformats.org/officeDocument/2006/relationships" xmlns:p="http://schemas.openxmlformats.org/presentationml/2006/main" preserve="1" userDrawn="1">
   <p:cSld name="NVI verdier">
     <p:spTree>
       <p:nvGrpSpPr>
@@ -1432,6 +1377,7 @@
               <a:srgbClr val="00A6EB"/>
             </a:solidFill>
           </a:ln>
+          <a:effectLst/>
         </p:spPr>
         <p:style>
           <a:lnRef idx="1">
@@ -1881,60 +1827,6 @@
           </a:extLst>
         </p:spPr>
       </p:pic>
-      <p:pic>
-        <p:nvPicPr>
-          <p:cNvPr id="14" name="Bilde 15" descr="stripe-tynn.jpg"/>
-          <p:cNvPicPr>
-            <a:picLocks/>
-          </p:cNvPicPr>
-          <p:nvPr userDrawn="1"/>
-        </p:nvPicPr>
-        <p:blipFill>
-          <a:blip r:embed="rId3">
-            <a:extLst>
-              <a:ext uri="{28A0092B-C50C-407E-A947-70E740481C1C}">
-                <a14:useLocalDpi xmlns:a14="http://schemas.microsoft.com/office/drawing/2010/main" val="0"/>
-              </a:ext>
-            </a:extLst>
-          </a:blip>
-          <a:srcRect/>
-          <a:stretch>
-            <a:fillRect/>
-          </a:stretch>
-        </p:blipFill>
-        <p:spPr bwMode="auto">
-          <a:xfrm>
-            <a:off x="1" y="5048250"/>
-            <a:ext cx="9144000" cy="95250"/>
-          </a:xfrm>
-          <a:prstGeom prst="rect">
-            <a:avLst/>
-          </a:prstGeom>
-          <a:noFill/>
-          <a:ln>
-            <a:noFill/>
-          </a:ln>
-          <a:extLst>
-            <a:ext uri="{909E8E84-426E-40DD-AFC4-6F175D3DCCD1}">
-              <a14:hiddenFill xmlns:a14="http://schemas.microsoft.com/office/drawing/2010/main">
-                <a:solidFill>
-                  <a:srgbClr val="FFFFFF"/>
-                </a:solidFill>
-              </a14:hiddenFill>
-            </a:ext>
-            <a:ext uri="{91240B29-F687-4F45-9708-019B960494DF}">
-              <a14:hiddenLine xmlns:a14="http://schemas.microsoft.com/office/drawing/2010/main" w="9525">
-                <a:solidFill>
-                  <a:srgbClr val="000000"/>
-                </a:solidFill>
-                <a:miter lim="800000"/>
-                <a:headEnd/>
-                <a:tailEnd/>
-              </a14:hiddenLine>
-            </a:ext>
-          </a:extLst>
-        </p:spPr>
-      </p:pic>
     </p:spTree>
     <p:extLst>
       <p:ext uri="{BB962C8B-B14F-4D97-AF65-F5344CB8AC3E}">
@@ -1949,7 +1841,7 @@
 </file>
 
 <file path=ppt/slideLayouts/slideLayout13.xml><?xml version="1.0" encoding="utf-8"?>
-<p:sldLayout xmlns:a="http://schemas.openxmlformats.org/drawingml/2006/main" xmlns:r="http://schemas.openxmlformats.org/officeDocument/2006/relationships" xmlns:p="http://schemas.openxmlformats.org/presentationml/2006/main" showMasterSp="0" preserve="1" userDrawn="1">
+<p:sldLayout xmlns:a="http://schemas.openxmlformats.org/drawingml/2006/main" xmlns:r="http://schemas.openxmlformats.org/officeDocument/2006/relationships" xmlns:p="http://schemas.openxmlformats.org/presentationml/2006/main" preserve="1" userDrawn="1">
   <p:cSld name="NVI values">
     <p:spTree>
       <p:nvGrpSpPr>
@@ -1987,6 +1879,7 @@
               <a:srgbClr val="00A6EB"/>
             </a:solidFill>
           </a:ln>
+          <a:effectLst/>
         </p:spPr>
         <p:style>
           <a:lnRef idx="1">
@@ -2416,60 +2309,6 @@
           <a:xfrm>
             <a:off x="1414463" y="2576513"/>
             <a:ext cx="6315075" cy="1352550"/>
-          </a:xfrm>
-          <a:prstGeom prst="rect">
-            <a:avLst/>
-          </a:prstGeom>
-          <a:noFill/>
-          <a:ln>
-            <a:noFill/>
-          </a:ln>
-          <a:extLst>
-            <a:ext uri="{909E8E84-426E-40DD-AFC4-6F175D3DCCD1}">
-              <a14:hiddenFill xmlns:a14="http://schemas.microsoft.com/office/drawing/2010/main">
-                <a:solidFill>
-                  <a:srgbClr val="FFFFFF"/>
-                </a:solidFill>
-              </a14:hiddenFill>
-            </a:ext>
-            <a:ext uri="{91240B29-F687-4F45-9708-019B960494DF}">
-              <a14:hiddenLine xmlns:a14="http://schemas.microsoft.com/office/drawing/2010/main" w="9525">
-                <a:solidFill>
-                  <a:srgbClr val="000000"/>
-                </a:solidFill>
-                <a:miter lim="800000"/>
-                <a:headEnd/>
-                <a:tailEnd/>
-              </a14:hiddenLine>
-            </a:ext>
-          </a:extLst>
-        </p:spPr>
-      </p:pic>
-      <p:pic>
-        <p:nvPicPr>
-          <p:cNvPr id="14" name="Bilde 15" descr="stripe-tynn.jpg"/>
-          <p:cNvPicPr>
-            <a:picLocks/>
-          </p:cNvPicPr>
-          <p:nvPr userDrawn="1"/>
-        </p:nvPicPr>
-        <p:blipFill>
-          <a:blip r:embed="rId3">
-            <a:extLst>
-              <a:ext uri="{28A0092B-C50C-407E-A947-70E740481C1C}">
-                <a14:useLocalDpi xmlns:a14="http://schemas.microsoft.com/office/drawing/2010/main" val="0"/>
-              </a:ext>
-            </a:extLst>
-          </a:blip>
-          <a:srcRect/>
-          <a:stretch>
-            <a:fillRect/>
-          </a:stretch>
-        </p:blipFill>
-        <p:spPr bwMode="auto">
-          <a:xfrm>
-            <a:off x="1" y="5048250"/>
-            <a:ext cx="9144000" cy="95250"/>
           </a:xfrm>
           <a:prstGeom prst="rect">
             <a:avLst/>
@@ -4658,6 +4497,13 @@
   <p:clrMapOvr>
     <a:masterClrMapping/>
   </p:clrMapOvr>
+  <p:timing>
+    <p:tnLst>
+      <p:par>
+        <p:cTn id="1" dur="indefinite" restart="never" nodeType="tmRoot"/>
+      </p:par>
+    </p:tnLst>
+  </p:timing>
 </p:sld>
 </file>
 
@@ -4739,6 +4585,13 @@
   <p:clrMapOvr>
     <a:masterClrMapping/>
   </p:clrMapOvr>
+  <p:timing>
+    <p:tnLst>
+      <p:par>
+        <p:cTn id="1" dur="indefinite" restart="never" nodeType="tmRoot"/>
+      </p:par>
+    </p:tnLst>
+  </p:timing>
 </p:sld>
 </file>
 

</xml_diff>